<commit_message>
wow this is the end
</commit_message>
<xml_diff>
--- a/Обнаружение_аномалий_в_операционной_системе_Windows.pptx
+++ b/Обнаружение_аномалий_в_операционной_системе_Windows.pptx
@@ -10,9 +10,13 @@
     <p:sldId id="259" r:id="rId4"/>
     <p:sldId id="258" r:id="rId5"/>
     <p:sldId id="260" r:id="rId6"/>
-    <p:sldId id="261" r:id="rId7"/>
-    <p:sldId id="262" r:id="rId8"/>
-    <p:sldId id="264" r:id="rId9"/>
+    <p:sldId id="262" r:id="rId7"/>
+    <p:sldId id="267" r:id="rId8"/>
+    <p:sldId id="268" r:id="rId9"/>
+    <p:sldId id="265" r:id="rId10"/>
+    <p:sldId id="269" r:id="rId11"/>
+    <p:sldId id="270" r:id="rId12"/>
+    <p:sldId id="264" r:id="rId13"/>
   </p:sldIdLst>
   <p:sldSz cx="12192000" cy="6858000"/>
   <p:notesSz cx="6858000" cy="9144000"/>
@@ -522,7 +526,7 @@
           <a:p>
             <a:fld id="{6B30F945-E360-4D33-8866-488F71D65AA0}" type="datetimeFigureOut">
               <a:rPr lang="ru-RU" smtClean="0"/>
-              <a:t>23.10.2021</a:t>
+              <a:t>11.12.2021</a:t>
             </a:fld>
             <a:endParaRPr lang="ru-RU"/>
           </a:p>
@@ -701,7 +705,7 @@
           <a:p>
             <a:fld id="{6B30F945-E360-4D33-8866-488F71D65AA0}" type="datetimeFigureOut">
               <a:rPr lang="ru-RU" smtClean="0"/>
-              <a:t>23.10.2021</a:t>
+              <a:t>11.12.2021</a:t>
             </a:fld>
             <a:endParaRPr lang="ru-RU"/>
           </a:p>
@@ -881,7 +885,7 @@
           <a:p>
             <a:fld id="{6B30F945-E360-4D33-8866-488F71D65AA0}" type="datetimeFigureOut">
               <a:rPr lang="ru-RU" smtClean="0"/>
-              <a:t>23.10.2021</a:t>
+              <a:t>11.12.2021</a:t>
             </a:fld>
             <a:endParaRPr lang="ru-RU"/>
           </a:p>
@@ -1051,7 +1055,7 @@
           <a:p>
             <a:fld id="{6B30F945-E360-4D33-8866-488F71D65AA0}" type="datetimeFigureOut">
               <a:rPr lang="ru-RU" smtClean="0"/>
-              <a:t>23.10.2021</a:t>
+              <a:t>11.12.2021</a:t>
             </a:fld>
             <a:endParaRPr lang="ru-RU"/>
           </a:p>
@@ -1364,7 +1368,7 @@
           <a:p>
             <a:fld id="{6B30F945-E360-4D33-8866-488F71D65AA0}" type="datetimeFigureOut">
               <a:rPr lang="ru-RU" smtClean="0"/>
-              <a:t>23.10.2021</a:t>
+              <a:t>11.12.2021</a:t>
             </a:fld>
             <a:endParaRPr lang="ru-RU"/>
           </a:p>
@@ -1750,7 +1754,7 @@
           <a:p>
             <a:fld id="{6B30F945-E360-4D33-8866-488F71D65AA0}" type="datetimeFigureOut">
               <a:rPr lang="ru-RU" smtClean="0"/>
-              <a:t>23.10.2021</a:t>
+              <a:t>11.12.2021</a:t>
             </a:fld>
             <a:endParaRPr lang="ru-RU"/>
           </a:p>
@@ -2184,7 +2188,7 @@
           <a:p>
             <a:fld id="{6B30F945-E360-4D33-8866-488F71D65AA0}" type="datetimeFigureOut">
               <a:rPr lang="ru-RU" smtClean="0"/>
-              <a:t>23.10.2021</a:t>
+              <a:t>11.12.2021</a:t>
             </a:fld>
             <a:endParaRPr lang="ru-RU"/>
           </a:p>
@@ -2302,7 +2306,7 @@
           <a:p>
             <a:fld id="{6B30F945-E360-4D33-8866-488F71D65AA0}" type="datetimeFigureOut">
               <a:rPr lang="ru-RU" smtClean="0"/>
-              <a:t>23.10.2021</a:t>
+              <a:t>11.12.2021</a:t>
             </a:fld>
             <a:endParaRPr lang="ru-RU"/>
           </a:p>
@@ -2397,7 +2401,7 @@
           <a:p>
             <a:fld id="{6B30F945-E360-4D33-8866-488F71D65AA0}" type="datetimeFigureOut">
               <a:rPr lang="ru-RU" smtClean="0"/>
-              <a:t>23.10.2021</a:t>
+              <a:t>11.12.2021</a:t>
             </a:fld>
             <a:endParaRPr lang="ru-RU"/>
           </a:p>
@@ -2747,7 +2751,7 @@
           <a:p>
             <a:fld id="{6B30F945-E360-4D33-8866-488F71D65AA0}" type="datetimeFigureOut">
               <a:rPr lang="ru-RU" smtClean="0"/>
-              <a:t>23.10.2021</a:t>
+              <a:t>11.12.2021</a:t>
             </a:fld>
             <a:endParaRPr lang="ru-RU"/>
           </a:p>
@@ -3172,7 +3176,7 @@
           <a:p>
             <a:fld id="{6B30F945-E360-4D33-8866-488F71D65AA0}" type="datetimeFigureOut">
               <a:rPr lang="ru-RU" smtClean="0"/>
-              <a:t>23.10.2021</a:t>
+              <a:t>11.12.2021</a:t>
             </a:fld>
             <a:endParaRPr lang="ru-RU"/>
           </a:p>
@@ -3453,7 +3457,7 @@
           <a:p>
             <a:fld id="{6B30F945-E360-4D33-8866-488F71D65AA0}" type="datetimeFigureOut">
               <a:rPr lang="ru-RU" smtClean="0"/>
-              <a:t>23.10.2021</a:t>
+              <a:t>11.12.2021</a:t>
             </a:fld>
             <a:endParaRPr lang="ru-RU"/>
           </a:p>
@@ -4144,6 +4148,364 @@
 </p:sld>
 </file>
 
+<file path=ppt/slides/slide10.xml><?xml version="1.0" encoding="utf-8"?>
+<p:sld xmlns:a="http://schemas.openxmlformats.org/drawingml/2006/main" xmlns:r="http://schemas.openxmlformats.org/officeDocument/2006/relationships" xmlns:p="http://schemas.openxmlformats.org/presentationml/2006/main">
+  <p:cSld>
+    <p:spTree>
+      <p:nvGrpSpPr>
+        <p:cNvPr id="1" name=""/>
+        <p:cNvGrpSpPr/>
+        <p:nvPr/>
+      </p:nvGrpSpPr>
+      <p:grpSpPr>
+        <a:xfrm>
+          <a:off x="0" y="0"/>
+          <a:ext cx="0" cy="0"/>
+          <a:chOff x="0" y="0"/>
+          <a:chExt cx="0" cy="0"/>
+        </a:xfrm>
+      </p:grpSpPr>
+      <p:sp>
+        <p:nvSpPr>
+          <p:cNvPr id="2" name="Заголовок 1">
+            <a:extLst>
+              <a:ext uri="{FF2B5EF4-FFF2-40B4-BE49-F238E27FC236}">
+                <a16:creationId xmlns:a16="http://schemas.microsoft.com/office/drawing/2014/main" id="{320FCF71-2005-40B9-A600-3B19661E5F42}"/>
+              </a:ext>
+            </a:extLst>
+          </p:cNvPr>
+          <p:cNvSpPr>
+            <a:spLocks noGrp="1"/>
+          </p:cNvSpPr>
+          <p:nvPr>
+            <p:ph type="title"/>
+          </p:nvPr>
+        </p:nvSpPr>
+        <p:spPr/>
+        <p:txBody>
+          <a:bodyPr/>
+          <a:lstStyle/>
+          <a:p>
+            <a:r>
+              <a:rPr lang="ru-RU" dirty="0"/>
+              <a:t>Результаты</a:t>
+            </a:r>
+          </a:p>
+        </p:txBody>
+      </p:sp>
+      <p:sp>
+        <p:nvSpPr>
+          <p:cNvPr id="3" name="Объект 2">
+            <a:extLst>
+              <a:ext uri="{FF2B5EF4-FFF2-40B4-BE49-F238E27FC236}">
+                <a16:creationId xmlns:a16="http://schemas.microsoft.com/office/drawing/2014/main" id="{903BEEFD-F2D6-4D4F-A3E2-74080C711E1C}"/>
+              </a:ext>
+            </a:extLst>
+          </p:cNvPr>
+          <p:cNvSpPr>
+            <a:spLocks noGrp="1"/>
+          </p:cNvSpPr>
+          <p:nvPr>
+            <p:ph idx="1"/>
+          </p:nvPr>
+        </p:nvSpPr>
+        <p:spPr/>
+        <p:txBody>
+          <a:bodyPr/>
+          <a:lstStyle/>
+          <a:p>
+            <a:r>
+              <a:rPr lang="ru-RU" dirty="0"/>
+              <a:t>За этот семестр была проделана работа по изучению и извлечению </a:t>
+            </a:r>
+            <a:r>
+              <a:rPr lang="ru-RU" dirty="0" err="1"/>
+              <a:t>логов,а</a:t>
+            </a:r>
+            <a:r>
+              <a:rPr lang="ru-RU" dirty="0"/>
+              <a:t> также по созданию структурированной системы добытых нами логов.</a:t>
+            </a:r>
+          </a:p>
+        </p:txBody>
+      </p:sp>
+    </p:spTree>
+    <p:extLst>
+      <p:ext uri="{BB962C8B-B14F-4D97-AF65-F5344CB8AC3E}">
+        <p14:creationId xmlns:p14="http://schemas.microsoft.com/office/powerpoint/2010/main" val="403092719"/>
+      </p:ext>
+    </p:extLst>
+  </p:cSld>
+  <p:clrMapOvr>
+    <a:masterClrMapping/>
+  </p:clrMapOvr>
+</p:sld>
+</file>
+
+<file path=ppt/slides/slide11.xml><?xml version="1.0" encoding="utf-8"?>
+<p:sld xmlns:a="http://schemas.openxmlformats.org/drawingml/2006/main" xmlns:r="http://schemas.openxmlformats.org/officeDocument/2006/relationships" xmlns:p="http://schemas.openxmlformats.org/presentationml/2006/main">
+  <p:cSld>
+    <p:spTree>
+      <p:nvGrpSpPr>
+        <p:cNvPr id="1" name=""/>
+        <p:cNvGrpSpPr/>
+        <p:nvPr/>
+      </p:nvGrpSpPr>
+      <p:grpSpPr>
+        <a:xfrm>
+          <a:off x="0" y="0"/>
+          <a:ext cx="0" cy="0"/>
+          <a:chOff x="0" y="0"/>
+          <a:chExt cx="0" cy="0"/>
+        </a:xfrm>
+      </p:grpSpPr>
+      <p:sp>
+        <p:nvSpPr>
+          <p:cNvPr id="3" name="Объект 2">
+            <a:extLst>
+              <a:ext uri="{FF2B5EF4-FFF2-40B4-BE49-F238E27FC236}">
+                <a16:creationId xmlns:a16="http://schemas.microsoft.com/office/drawing/2014/main" id="{C3D284D8-F2E9-46C8-A9A0-9D304D2E9582}"/>
+              </a:ext>
+            </a:extLst>
+          </p:cNvPr>
+          <p:cNvSpPr>
+            <a:spLocks noGrp="1"/>
+          </p:cNvSpPr>
+          <p:nvPr>
+            <p:ph idx="1"/>
+          </p:nvPr>
+        </p:nvSpPr>
+        <p:spPr>
+          <a:xfrm>
+            <a:off x="509047" y="527901"/>
+            <a:ext cx="10747538" cy="7376846"/>
+          </a:xfrm>
+        </p:spPr>
+        <p:txBody>
+          <a:bodyPr>
+            <a:normAutofit/>
+          </a:bodyPr>
+          <a:lstStyle/>
+          <a:p>
+            <a:pPr marL="0" indent="0">
+              <a:buNone/>
+            </a:pPr>
+            <a:r>
+              <a:rPr lang="ru-RU" sz="4000" dirty="0"/>
+              <a:t>         </a:t>
+            </a:r>
+            <a:r>
+              <a:rPr lang="en-US" sz="4000" dirty="0"/>
+              <a:t>Git</a:t>
+            </a:r>
+            <a:r>
+              <a:rPr lang="ru-RU" sz="4000" dirty="0"/>
+              <a:t>-</a:t>
+            </a:r>
+            <a:r>
+              <a:rPr lang="en-US" sz="4000" dirty="0"/>
+              <a:t>Hub</a:t>
+            </a:r>
+            <a:r>
+              <a:rPr lang="en-US" sz="4000" dirty="0">
+                <a:latin typeface="Rockwell (Основной текст)"/>
+              </a:rPr>
+              <a:t> </a:t>
+            </a:r>
+            <a:r>
+              <a:rPr lang="ru-RU" sz="4000" dirty="0">
+                <a:latin typeface="Rockwell (Основной текст)"/>
+              </a:rPr>
+              <a:t>                            </a:t>
+            </a:r>
+            <a:r>
+              <a:rPr lang="en-US" sz="4000" dirty="0">
+                <a:latin typeface="Rockwell (Основной текст)"/>
+              </a:rPr>
+              <a:t>Google-doc</a:t>
+            </a:r>
+            <a:endParaRPr lang="ru-RU" sz="4000" dirty="0"/>
+          </a:p>
+          <a:p>
+            <a:pPr marL="0" indent="0">
+              <a:buNone/>
+            </a:pPr>
+            <a:endParaRPr lang="ru-RU" sz="4000" dirty="0">
+              <a:latin typeface="Rockwell (Основной текст)"/>
+            </a:endParaRPr>
+          </a:p>
+          <a:p>
+            <a:endParaRPr lang="ru-RU" sz="4000" dirty="0"/>
+          </a:p>
+          <a:p>
+            <a:pPr marL="0" indent="0">
+              <a:buNone/>
+            </a:pPr>
+            <a:endParaRPr lang="ru-RU" sz="4000" dirty="0"/>
+          </a:p>
+        </p:txBody>
+      </p:sp>
+      <p:pic>
+        <p:nvPicPr>
+          <p:cNvPr id="4" name="Рисунок 3">
+            <a:extLst>
+              <a:ext uri="{FF2B5EF4-FFF2-40B4-BE49-F238E27FC236}">
+                <a16:creationId xmlns:a16="http://schemas.microsoft.com/office/drawing/2014/main" id="{3627F5B8-4802-4FAC-ADDA-F6B9D7E7C98D}"/>
+              </a:ext>
+            </a:extLst>
+          </p:cNvPr>
+          <p:cNvPicPr>
+            <a:picLocks noChangeAspect="1"/>
+          </p:cNvPicPr>
+          <p:nvPr/>
+        </p:nvPicPr>
+        <p:blipFill>
+          <a:blip r:embed="rId2"/>
+          <a:stretch>
+            <a:fillRect/>
+          </a:stretch>
+        </p:blipFill>
+        <p:spPr>
+          <a:xfrm>
+            <a:off x="6096000" y="1367359"/>
+            <a:ext cx="4688609" cy="3921078"/>
+          </a:xfrm>
+          <a:prstGeom prst="rect">
+            <a:avLst/>
+          </a:prstGeom>
+        </p:spPr>
+      </p:pic>
+      <p:pic>
+        <p:nvPicPr>
+          <p:cNvPr id="6" name="Рисунок 5">
+            <a:extLst>
+              <a:ext uri="{FF2B5EF4-FFF2-40B4-BE49-F238E27FC236}">
+                <a16:creationId xmlns:a16="http://schemas.microsoft.com/office/drawing/2014/main" id="{3AE89643-3B16-4711-A3A7-1D8BA379E225}"/>
+              </a:ext>
+            </a:extLst>
+          </p:cNvPr>
+          <p:cNvPicPr>
+            <a:picLocks noChangeAspect="1"/>
+          </p:cNvPicPr>
+          <p:nvPr/>
+        </p:nvPicPr>
+        <p:blipFill>
+          <a:blip r:embed="rId3"/>
+          <a:stretch>
+            <a:fillRect/>
+          </a:stretch>
+        </p:blipFill>
+        <p:spPr>
+          <a:xfrm>
+            <a:off x="246077" y="1290851"/>
+            <a:ext cx="4847195" cy="4247294"/>
+          </a:xfrm>
+          <a:prstGeom prst="rect">
+            <a:avLst/>
+          </a:prstGeom>
+        </p:spPr>
+      </p:pic>
+    </p:spTree>
+    <p:extLst>
+      <p:ext uri="{BB962C8B-B14F-4D97-AF65-F5344CB8AC3E}">
+        <p14:creationId xmlns:p14="http://schemas.microsoft.com/office/powerpoint/2010/main" val="4169086679"/>
+      </p:ext>
+    </p:extLst>
+  </p:cSld>
+  <p:clrMapOvr>
+    <a:masterClrMapping/>
+  </p:clrMapOvr>
+</p:sld>
+</file>
+
+<file path=ppt/slides/slide12.xml><?xml version="1.0" encoding="utf-8"?>
+<p:sld xmlns:a="http://schemas.openxmlformats.org/drawingml/2006/main" xmlns:r="http://schemas.openxmlformats.org/officeDocument/2006/relationships" xmlns:p="http://schemas.openxmlformats.org/presentationml/2006/main">
+  <p:cSld>
+    <p:spTree>
+      <p:nvGrpSpPr>
+        <p:cNvPr id="1" name=""/>
+        <p:cNvGrpSpPr/>
+        <p:nvPr/>
+      </p:nvGrpSpPr>
+      <p:grpSpPr>
+        <a:xfrm>
+          <a:off x="0" y="0"/>
+          <a:ext cx="0" cy="0"/>
+          <a:chOff x="0" y="0"/>
+          <a:chExt cx="0" cy="0"/>
+        </a:xfrm>
+      </p:grpSpPr>
+      <p:sp>
+        <p:nvSpPr>
+          <p:cNvPr id="2" name="Заголовок 1">
+            <a:extLst>
+              <a:ext uri="{FF2B5EF4-FFF2-40B4-BE49-F238E27FC236}">
+                <a16:creationId xmlns:a16="http://schemas.microsoft.com/office/drawing/2014/main" id="{737434F8-DDDD-42BC-86FA-BBCB9D58155C}"/>
+              </a:ext>
+            </a:extLst>
+          </p:cNvPr>
+          <p:cNvSpPr>
+            <a:spLocks noGrp="1"/>
+          </p:cNvSpPr>
+          <p:nvPr>
+            <p:ph type="title"/>
+          </p:nvPr>
+        </p:nvSpPr>
+        <p:spPr>
+          <a:xfrm>
+            <a:off x="1063752" y="2723979"/>
+            <a:ext cx="10058400" cy="1609344"/>
+          </a:xfrm>
+        </p:spPr>
+        <p:txBody>
+          <a:bodyPr/>
+          <a:lstStyle/>
+          <a:p>
+            <a:r>
+              <a:rPr lang="ru-RU" dirty="0"/>
+              <a:t>Спасибо за внимание!</a:t>
+            </a:r>
+          </a:p>
+        </p:txBody>
+      </p:sp>
+      <p:sp>
+        <p:nvSpPr>
+          <p:cNvPr id="3" name="Объект 2">
+            <a:extLst>
+              <a:ext uri="{FF2B5EF4-FFF2-40B4-BE49-F238E27FC236}">
+                <a16:creationId xmlns:a16="http://schemas.microsoft.com/office/drawing/2014/main" id="{BEC6CEDF-5834-4908-A09E-0E91EBF55946}"/>
+              </a:ext>
+            </a:extLst>
+          </p:cNvPr>
+          <p:cNvSpPr>
+            <a:spLocks noGrp="1"/>
+          </p:cNvSpPr>
+          <p:nvPr>
+            <p:ph idx="1"/>
+          </p:nvPr>
+        </p:nvSpPr>
+        <p:spPr/>
+        <p:txBody>
+          <a:bodyPr/>
+          <a:lstStyle/>
+          <a:p>
+            <a:endParaRPr lang="ru-RU"/>
+          </a:p>
+        </p:txBody>
+      </p:sp>
+    </p:spTree>
+    <p:extLst>
+      <p:ext uri="{BB962C8B-B14F-4D97-AF65-F5344CB8AC3E}">
+        <p14:creationId xmlns:p14="http://schemas.microsoft.com/office/powerpoint/2010/main" val="1585657996"/>
+      </p:ext>
+    </p:extLst>
+  </p:cSld>
+  <p:clrMapOvr>
+    <a:masterClrMapping/>
+  </p:clrMapOvr>
+</p:sld>
+</file>
+
 <file path=ppt/slides/slide2.xml><?xml version="1.0" encoding="utf-8"?>
 <p:sld xmlns:a="http://schemas.openxmlformats.org/drawingml/2006/main" xmlns:r="http://schemas.openxmlformats.org/officeDocument/2006/relationships" xmlns:p="http://schemas.openxmlformats.org/presentationml/2006/main">
   <p:cSld>
@@ -4228,15 +4590,9 @@
               <a:buNone/>
             </a:pPr>
             <a:r>
-              <a:rPr lang="ru-RU" sz="2500" dirty="0"/>
-              <a:t>Журнал событий ОС Windows является важным источником информации о работе пользователя за ПК, об ошибках и сбоях в программном обеспечении, о действиях системных администраторов, в том числе - скрытных для пользователя. Поиск аномалий в журнале событий ОС Windows– это инструмент, помогающий выявлять нарушения системы, неправильную работу программного обеспечения, ошибки в конфигурировании операционной системы. Однако нестандартное поведение системы нельзя однозначно ассоциировать с вторжением, поэтому мы решили поставить следующие задачи и цели.</a:t>
-            </a:r>
-          </a:p>
-          <a:p>
-            <a:pPr marL="0" indent="0">
-              <a:buNone/>
-            </a:pPr>
-            <a:endParaRPr lang="ru-RU" dirty="0"/>
+              <a:rPr lang="ru-RU" sz="3600" dirty="0"/>
+              <a:t>Журнал событий ОС Windows является важным источником информации о работе пользователя за ПК, об ошибках и сбоях в программном обеспечении, о действиях системных администраторов, в том числе - скрытных для пользователя. </a:t>
+            </a:r>
           </a:p>
         </p:txBody>
       </p:sp>
@@ -4293,7 +4649,7 @@
           <a:p>
             <a:r>
               <a:rPr lang="ru-RU" dirty="0"/>
-              <a:t>Проблема</a:t>
+              <a:t>Цель работы</a:t>
             </a:r>
           </a:p>
         </p:txBody>
@@ -4317,7 +4673,7 @@
         <p:spPr/>
         <p:txBody>
           <a:bodyPr>
-            <a:normAutofit lnSpcReduction="10000"/>
+            <a:normAutofit/>
           </a:bodyPr>
           <a:lstStyle/>
           <a:p>
@@ -4326,14 +4682,8 @@
             </a:pPr>
             <a:r>
               <a:rPr lang="ru-RU" sz="3600" dirty="0"/>
-              <a:t>Система не всегда дает отчёт по ошибках и багах внутри системы. На данный момент нет антивируса с открытым исходным кодом который смог бы по логам обработать наличие аномалий на компьютере. События системы могут быть полезны, но они не структурированы(нужна программа которая это делала бы) и давала результат об аномалиях системы.</a:t>
-            </a:r>
-          </a:p>
-          <a:p>
-            <a:pPr marL="0" indent="0">
-              <a:buNone/>
-            </a:pPr>
-            <a:endParaRPr lang="ru-RU" sz="3600" dirty="0"/>
+              <a:t>На данный момент нет программы с открытым исходным кодом, который смог бы по логам обработать наличие аномалий на компьютере. События системы могут быть полезны, но они не структурированы(нужна программ, которая это делала бы)</a:t>
+            </a:r>
           </a:p>
         </p:txBody>
       </p:sp>
@@ -4421,44 +4771,44 @@
           <p:nvPr>
             <p:extLst>
               <p:ext uri="{D42A27DB-BD31-4B8C-83A1-F6EECF244321}">
-                <p14:modId xmlns:p14="http://schemas.microsoft.com/office/powerpoint/2010/main" val="3735464784"/>
+                <p14:modId xmlns:p14="http://schemas.microsoft.com/office/powerpoint/2010/main" val="546330869"/>
               </p:ext>
             </p:extLst>
           </p:nvPr>
         </p:nvGraphicFramePr>
         <p:xfrm>
           <a:off x="472689" y="925689"/>
-          <a:ext cx="11528810" cy="5473939"/>
+          <a:ext cx="10798690" cy="5657906"/>
         </p:xfrm>
         <a:graphic>
           <a:graphicData uri="http://schemas.openxmlformats.org/drawingml/2006/table">
             <a:tbl>
-              <a:tblPr firstRow="1" firstCol="1" lastRow="1" lastCol="1" bandRow="1">
-                <a:tableStyleId>{10A1B5D5-9B99-4C35-A422-299274C87663}</a:tableStyleId>
+              <a:tblPr firstRow="1" bandRow="1">
+                <a:tableStyleId>{5C22544A-7EE6-4342-B048-85BDC9FD1C3A}</a:tableStyleId>
               </a:tblPr>
               <a:tblGrid>
-                <a:gridCol w="556057">
+                <a:gridCol w="696235">
                   <a:extLst>
                     <a:ext uri="{9D8B030D-6E8A-4147-A177-3AD203B41FA5}">
                       <a16:colId xmlns:a16="http://schemas.microsoft.com/office/drawing/2014/main" val="459644385"/>
                     </a:ext>
                   </a:extLst>
                 </a:gridCol>
-                <a:gridCol w="7279986">
+                <a:gridCol w="4703109">
                   <a:extLst>
                     <a:ext uri="{9D8B030D-6E8A-4147-A177-3AD203B41FA5}">
                       <a16:colId xmlns:a16="http://schemas.microsoft.com/office/drawing/2014/main" val="1599103009"/>
                     </a:ext>
                   </a:extLst>
                 </a:gridCol>
-                <a:gridCol w="2145323">
+                <a:gridCol w="2699673">
                   <a:extLst>
                     <a:ext uri="{9D8B030D-6E8A-4147-A177-3AD203B41FA5}">
                       <a16:colId xmlns:a16="http://schemas.microsoft.com/office/drawing/2014/main" val="2391913598"/>
                     </a:ext>
                   </a:extLst>
                 </a:gridCol>
-                <a:gridCol w="1547444">
+                <a:gridCol w="2699673">
                   <a:extLst>
                     <a:ext uri="{9D8B030D-6E8A-4147-A177-3AD203B41FA5}">
                       <a16:colId xmlns:a16="http://schemas.microsoft.com/office/drawing/2014/main" val="2571860088"/>
@@ -4466,7 +4816,7 @@
                   </a:extLst>
                 </a:gridCol>
               </a:tblGrid>
-              <a:tr h="606793">
+              <a:tr h="252662">
                 <a:tc>
                   <a:txBody>
                     <a:bodyPr/>
@@ -4478,7 +4828,33 @@
                       </a:r>
                     </a:p>
                   </a:txBody>
-                  <a:tcPr/>
+                  <a:tcPr>
+                    <a:lnL w="12700" cmpd="sng">
+                      <a:noFill/>
+                    </a:lnL>
+                    <a:lnR w="12700" cmpd="sng">
+                      <a:noFill/>
+                    </a:lnR>
+                    <a:lnT w="12700" cmpd="sng">
+                      <a:noFill/>
+                    </a:lnT>
+                    <a:lnB w="38100" cmpd="sng">
+                      <a:noFill/>
+                    </a:lnB>
+                    <a:lnTlToBr w="12700" cmpd="sng">
+                      <a:noFill/>
+                      <a:prstDash val="solid"/>
+                    </a:lnTlToBr>
+                    <a:lnBlToTr w="12700" cmpd="sng">
+                      <a:noFill/>
+                      <a:prstDash val="solid"/>
+                    </a:lnBlToTr>
+                    <a:solidFill>
+                      <a:schemeClr val="bg1">
+                        <a:lumMod val="85000"/>
+                      </a:schemeClr>
+                    </a:solidFill>
+                  </a:tcPr>
                 </a:tc>
                 <a:tc>
                   <a:txBody>
@@ -4491,7 +4867,16 @@
                       </a:r>
                     </a:p>
                   </a:txBody>
-                  <a:tcPr/>
+                  <a:tcPr>
+                    <a:lnL w="12700" cmpd="sng">
+                      <a:noFill/>
+                    </a:lnL>
+                    <a:solidFill>
+                      <a:schemeClr val="bg1">
+                        <a:lumMod val="85000"/>
+                      </a:schemeClr>
+                    </a:solidFill>
+                  </a:tcPr>
                 </a:tc>
                 <a:tc>
                   <a:txBody>
@@ -4504,7 +4889,13 @@
                       </a:r>
                     </a:p>
                   </a:txBody>
-                  <a:tcPr/>
+                  <a:tcPr>
+                    <a:solidFill>
+                      <a:schemeClr val="bg1">
+                        <a:lumMod val="85000"/>
+                      </a:schemeClr>
+                    </a:solidFill>
+                  </a:tcPr>
                 </a:tc>
                 <a:tc>
                   <a:txBody>
@@ -4517,7 +4908,13 @@
                       </a:r>
                     </a:p>
                   </a:txBody>
-                  <a:tcPr/>
+                  <a:tcPr>
+                    <a:solidFill>
+                      <a:schemeClr val="bg1">
+                        <a:lumMod val="85000"/>
+                      </a:schemeClr>
+                    </a:solidFill>
+                  </a:tcPr>
                 </a:tc>
                 <a:extLst>
                   <a:ext uri="{0D108BD9-81ED-4DB2-BD59-A6C34878D82A}">
@@ -4525,7 +4922,7 @@
                   </a:ext>
                 </a:extLst>
               </a:tr>
-              <a:tr h="648178">
+              <a:tr h="593564">
                 <a:tc>
                   <a:txBody>
                     <a:bodyPr/>
@@ -4537,7 +4934,16 @@
                       </a:r>
                     </a:p>
                   </a:txBody>
-                  <a:tcPr/>
+                  <a:tcPr>
+                    <a:lnT w="38100" cmpd="sng">
+                      <a:noFill/>
+                    </a:lnT>
+                    <a:solidFill>
+                      <a:schemeClr val="bg1">
+                        <a:lumMod val="85000"/>
+                      </a:schemeClr>
+                    </a:solidFill>
+                  </a:tcPr>
                 </a:tc>
                 <a:tc>
                   <a:txBody>
@@ -4563,7 +4969,13 @@
                       <a:endParaRPr lang="ru-RU" sz="1600" dirty="0"/>
                     </a:p>
                   </a:txBody>
-                  <a:tcPr/>
+                  <a:tcPr>
+                    <a:solidFill>
+                      <a:schemeClr val="bg1">
+                        <a:lumMod val="85000"/>
+                      </a:schemeClr>
+                    </a:solidFill>
+                  </a:tcPr>
                 </a:tc>
                 <a:tc>
                   <a:txBody>
@@ -4582,7 +4994,13 @@
                       </a:r>
                     </a:p>
                   </a:txBody>
-                  <a:tcPr/>
+                  <a:tcPr>
+                    <a:solidFill>
+                      <a:schemeClr val="bg1">
+                        <a:lumMod val="85000"/>
+                      </a:schemeClr>
+                    </a:solidFill>
+                  </a:tcPr>
                 </a:tc>
                 <a:tc>
                   <a:txBody>
@@ -4595,7 +5013,13 @@
                       </a:r>
                     </a:p>
                   </a:txBody>
-                  <a:tcPr/>
+                  <a:tcPr>
+                    <a:solidFill>
+                      <a:schemeClr val="bg1">
+                        <a:lumMod val="85000"/>
+                      </a:schemeClr>
+                    </a:solidFill>
+                  </a:tcPr>
                 </a:tc>
                 <a:extLst>
                   <a:ext uri="{0D108BD9-81ED-4DB2-BD59-A6C34878D82A}">
@@ -4603,7 +5027,7 @@
                   </a:ext>
                 </a:extLst>
               </a:tr>
-              <a:tr h="432122">
+              <a:tr h="593564">
                 <a:tc>
                   <a:txBody>
                     <a:bodyPr/>
@@ -4615,7 +5039,13 @@
                       </a:r>
                     </a:p>
                   </a:txBody>
-                  <a:tcPr/>
+                  <a:tcPr>
+                    <a:solidFill>
+                      <a:schemeClr val="bg1">
+                        <a:lumMod val="85000"/>
+                      </a:schemeClr>
+                    </a:solidFill>
+                  </a:tcPr>
                 </a:tc>
                 <a:tc>
                   <a:txBody>
@@ -4636,7 +5066,13 @@
                       </a:r>
                     </a:p>
                   </a:txBody>
-                  <a:tcPr/>
+                  <a:tcPr>
+                    <a:solidFill>
+                      <a:schemeClr val="bg1">
+                        <a:lumMod val="85000"/>
+                      </a:schemeClr>
+                    </a:solidFill>
+                  </a:tcPr>
                 </a:tc>
                 <a:tc>
                   <a:txBody>
@@ -4649,7 +5085,13 @@
                       </a:r>
                     </a:p>
                   </a:txBody>
-                  <a:tcPr/>
+                  <a:tcPr>
+                    <a:solidFill>
+                      <a:schemeClr val="bg1">
+                        <a:lumMod val="85000"/>
+                      </a:schemeClr>
+                    </a:solidFill>
+                  </a:tcPr>
                 </a:tc>
                 <a:tc>
                   <a:txBody>
@@ -4662,7 +5104,13 @@
                       </a:r>
                     </a:p>
                   </a:txBody>
-                  <a:tcPr/>
+                  <a:tcPr>
+                    <a:solidFill>
+                      <a:schemeClr val="bg1">
+                        <a:lumMod val="85000"/>
+                      </a:schemeClr>
+                    </a:solidFill>
+                  </a:tcPr>
                 </a:tc>
                 <a:extLst>
                   <a:ext uri="{0D108BD9-81ED-4DB2-BD59-A6C34878D82A}">
@@ -4670,7 +5118,7 @@
                   </a:ext>
                 </a:extLst>
               </a:tr>
-              <a:tr h="662488">
+              <a:tr h="837972">
                 <a:tc>
                   <a:txBody>
                     <a:bodyPr/>
@@ -4682,7 +5130,13 @@
                       </a:r>
                     </a:p>
                   </a:txBody>
-                  <a:tcPr/>
+                  <a:tcPr>
+                    <a:solidFill>
+                      <a:schemeClr val="bg1">
+                        <a:lumMod val="85000"/>
+                      </a:schemeClr>
+                    </a:solidFill>
+                  </a:tcPr>
                 </a:tc>
                 <a:tc>
                   <a:txBody>
@@ -4699,31 +5153,25 @@
                       </a:r>
                       <a:r>
                         <a:rPr lang="ru-RU" sz="1600" dirty="0"/>
-                        <a:t> разными способами(</a:t>
+                        <a:t> разными способами(Монитор процессов </a:t>
                       </a:r>
                       <a:r>
                         <a:rPr lang="en-US" sz="1600" dirty="0" err="1"/>
-                        <a:t>eventvwr</a:t>
-                      </a:r>
-                      <a:r>
-                        <a:rPr lang="en-US" sz="1600" dirty="0"/>
-                        <a:t>-</a:t>
+                        <a:t>Windows,Sysmon</a:t>
                       </a:r>
                       <a:r>
                         <a:rPr lang="ru-RU" sz="1600" dirty="0"/>
-                        <a:t>стандартный способ просмотра</a:t>
-                      </a:r>
-                      <a:r>
-                        <a:rPr lang="en-US" sz="1600" dirty="0"/>
-                        <a:t>,Sysmon</a:t>
-                      </a:r>
-                      <a:r>
-                        <a:rPr lang="ru-RU" sz="1600" dirty="0"/>
-                        <a:t>),понять с каким работать удобнее</a:t>
+                        <a:t>),вычислить каким работать удобнее</a:t>
                       </a:r>
                     </a:p>
                   </a:txBody>
-                  <a:tcPr/>
+                  <a:tcPr>
+                    <a:solidFill>
+                      <a:schemeClr val="bg1">
+                        <a:lumMod val="85000"/>
+                      </a:schemeClr>
+                    </a:solidFill>
+                  </a:tcPr>
                 </a:tc>
                 <a:tc>
                   <a:txBody>
@@ -4736,7 +5184,13 @@
                       </a:r>
                     </a:p>
                   </a:txBody>
-                  <a:tcPr/>
+                  <a:tcPr>
+                    <a:solidFill>
+                      <a:schemeClr val="bg1">
+                        <a:lumMod val="85000"/>
+                      </a:schemeClr>
+                    </a:solidFill>
+                  </a:tcPr>
                 </a:tc>
                 <a:tc>
                   <a:txBody>
@@ -4749,7 +5203,13 @@
                       </a:r>
                     </a:p>
                   </a:txBody>
-                  <a:tcPr/>
+                  <a:tcPr>
+                    <a:solidFill>
+                      <a:schemeClr val="bg1">
+                        <a:lumMod val="85000"/>
+                      </a:schemeClr>
+                    </a:solidFill>
+                  </a:tcPr>
                 </a:tc>
                 <a:extLst>
                   <a:ext uri="{0D108BD9-81ED-4DB2-BD59-A6C34878D82A}">
@@ -4757,7 +5217,7 @@
                   </a:ext>
                 </a:extLst>
               </a:tr>
-              <a:tr h="648178">
+              <a:tr h="593564">
                 <a:tc>
                   <a:txBody>
                     <a:bodyPr/>
@@ -4768,8 +5228,17 @@
                         <a:t>4</a:t>
                       </a:r>
                     </a:p>
+                    <a:p>
+                      <a:endParaRPr lang="ru-RU" sz="1600" dirty="0"/>
+                    </a:p>
                   </a:txBody>
-                  <a:tcPr/>
+                  <a:tcPr>
+                    <a:solidFill>
+                      <a:schemeClr val="bg1">
+                        <a:lumMod val="85000"/>
+                      </a:schemeClr>
+                    </a:solidFill>
+                  </a:tcPr>
                 </a:tc>
                 <a:tc>
                   <a:txBody>
@@ -4778,19 +5247,17 @@
                     <a:p>
                       <a:r>
                         <a:rPr lang="ru-RU" sz="1600" dirty="0"/>
-                        <a:t>Создать структурированную таблицу(</a:t>
-                      </a:r>
-                      <a:r>
-                        <a:rPr lang="ru-RU" sz="1600" dirty="0" err="1"/>
-                        <a:t>датафрейм</a:t>
-                      </a:r>
-                      <a:r>
-                        <a:rPr lang="ru-RU" sz="1600" dirty="0"/>
-                        <a:t>) логов(с указанием родителей и дочерних)</a:t>
+                        <a:t>Создать структурированную систему логов(с указанием родителей и дочерних)</a:t>
                       </a:r>
                     </a:p>
                   </a:txBody>
-                  <a:tcPr/>
+                  <a:tcPr>
+                    <a:solidFill>
+                      <a:schemeClr val="bg1">
+                        <a:lumMod val="85000"/>
+                      </a:schemeClr>
+                    </a:solidFill>
+                  </a:tcPr>
                 </a:tc>
                 <a:tc>
                   <a:txBody>
@@ -4809,7 +5276,13 @@
                       </a:r>
                     </a:p>
                   </a:txBody>
-                  <a:tcPr/>
+                  <a:tcPr>
+                    <a:solidFill>
+                      <a:schemeClr val="bg1">
+                        <a:lumMod val="85000"/>
+                      </a:schemeClr>
+                    </a:solidFill>
+                  </a:tcPr>
                 </a:tc>
                 <a:tc>
                   <a:txBody>
@@ -4818,11 +5291,17 @@
                     <a:p>
                       <a:r>
                         <a:rPr lang="ru-RU" sz="1600" dirty="0"/>
-                        <a:t>50 %</a:t>
+                        <a:t>100 %</a:t>
                       </a:r>
                     </a:p>
                   </a:txBody>
-                  <a:tcPr/>
+                  <a:tcPr>
+                    <a:solidFill>
+                      <a:schemeClr val="bg1">
+                        <a:lumMod val="85000"/>
+                      </a:schemeClr>
+                    </a:solidFill>
+                  </a:tcPr>
                 </a:tc>
                 <a:extLst>
                   <a:ext uri="{0D108BD9-81ED-4DB2-BD59-A6C34878D82A}">
@@ -4830,19 +5309,26 @@
                   </a:ext>
                 </a:extLst>
               </a:tr>
-              <a:tr h="457537">
+              <a:tr h="593564">
                 <a:tc>
                   <a:txBody>
                     <a:bodyPr/>
                     <a:lstStyle/>
                     <a:p>
                       <a:r>
-                        <a:rPr lang="ru-RU" sz="1600" dirty="0"/>
+                        <a:rPr lang="en-US" sz="1600" dirty="0"/>
                         <a:t>5</a:t>
                       </a:r>
+                      <a:endParaRPr lang="ru-RU" sz="1600" dirty="0"/>
                     </a:p>
                   </a:txBody>
-                  <a:tcPr/>
+                  <a:tcPr>
+                    <a:solidFill>
+                      <a:schemeClr val="bg1">
+                        <a:lumMod val="85000"/>
+                      </a:schemeClr>
+                    </a:solidFill>
+                  </a:tcPr>
                 </a:tc>
                 <a:tc>
                   <a:txBody>
@@ -4851,21 +5337,33 @@
                     <a:p>
                       <a:r>
                         <a:rPr lang="ru-RU" sz="1600" dirty="0"/>
-                        <a:t>Решить проблему с обработкой категориальных признаков</a:t>
+                        <a:t>Перевод в удобный </a:t>
+                      </a:r>
+                      <a:r>
+                        <a:rPr lang="en-US" sz="1600" dirty="0" err="1"/>
+                        <a:t>Dataframe</a:t>
+                      </a:r>
+                      <a:r>
+                        <a:rPr lang="ru-RU" sz="1600" dirty="0"/>
+                        <a:t> из Журнала событий </a:t>
+                      </a:r>
+                      <a:r>
+                        <a:rPr lang="en-US" sz="1600" dirty="0"/>
+                        <a:t>Windows</a:t>
+                      </a:r>
+                      <a:r>
+                        <a:rPr lang="ru-RU" sz="1600" dirty="0"/>
+                        <a:t> с указанием характеристик логов</a:t>
                       </a:r>
                     </a:p>
                   </a:txBody>
-                  <a:tcPr/>
-                </a:tc>
-                <a:tc>
-                  <a:txBody>
-                    <a:bodyPr/>
-                    <a:lstStyle/>
-                    <a:p>
-                      <a:endParaRPr lang="ru-RU" sz="1600" dirty="0"/>
-                    </a:p>
-                  </a:txBody>
-                  <a:tcPr/>
+                  <a:tcPr>
+                    <a:solidFill>
+                      <a:schemeClr val="bg1">
+                        <a:lumMod val="85000"/>
+                      </a:schemeClr>
+                    </a:solidFill>
+                  </a:tcPr>
                 </a:tc>
                 <a:tc>
                   <a:txBody>
@@ -4874,54 +5372,17 @@
                     <a:p>
                       <a:r>
                         <a:rPr lang="ru-RU" sz="1600" dirty="0"/>
-                        <a:t>0%</a:t>
+                        <a:t>Павлов Даниил</a:t>
                       </a:r>
                     </a:p>
                   </a:txBody>
-                  <a:tcPr/>
-                </a:tc>
-                <a:extLst>
-                  <a:ext uri="{0D108BD9-81ED-4DB2-BD59-A6C34878D82A}">
-                    <a16:rowId xmlns:a16="http://schemas.microsoft.com/office/drawing/2014/main" val="3321950852"/>
-                  </a:ext>
-                </a:extLst>
-              </a:tr>
-              <a:tr h="366129">
-                <a:tc>
-                  <a:txBody>
-                    <a:bodyPr/>
-                    <a:lstStyle/>
-                    <a:p>
-                      <a:r>
-                        <a:rPr lang="ru-RU" sz="1600" dirty="0"/>
-                        <a:t>6</a:t>
-                      </a:r>
-                    </a:p>
-                  </a:txBody>
-                  <a:tcPr/>
-                </a:tc>
-                <a:tc>
-                  <a:txBody>
-                    <a:bodyPr/>
-                    <a:lstStyle/>
-                    <a:p>
-                      <a:r>
-                        <a:rPr lang="ru-RU" sz="1600" dirty="0"/>
-                        <a:t>Восстановление иерархии</a:t>
-                      </a:r>
-                    </a:p>
-                  </a:txBody>
-                  <a:tcPr/>
-                </a:tc>
-                <a:tc>
-                  <a:txBody>
-                    <a:bodyPr/>
-                    <a:lstStyle/>
-                    <a:p>
-                      <a:endParaRPr lang="ru-RU" sz="1600" dirty="0"/>
-                    </a:p>
-                  </a:txBody>
-                  <a:tcPr/>
+                  <a:tcPr>
+                    <a:solidFill>
+                      <a:schemeClr val="bg1">
+                        <a:lumMod val="85000"/>
+                      </a:schemeClr>
+                    </a:solidFill>
+                  </a:tcPr>
                 </a:tc>
                 <a:tc>
                   <a:txBody>
@@ -4947,19 +5408,109 @@
                       </a:pPr>
                       <a:r>
                         <a:rPr lang="ru-RU" sz="1600" dirty="0"/>
-                        <a:t>0%</a:t>
+                        <a:t>100%</a:t>
                       </a:r>
                     </a:p>
                   </a:txBody>
-                  <a:tcPr/>
+                  <a:tcPr>
+                    <a:solidFill>
+                      <a:schemeClr val="bg1">
+                        <a:lumMod val="85000"/>
+                      </a:schemeClr>
+                    </a:solidFill>
+                  </a:tcPr>
                 </a:tc>
                 <a:extLst>
                   <a:ext uri="{0D108BD9-81ED-4DB2-BD59-A6C34878D82A}">
-                    <a16:rowId xmlns:a16="http://schemas.microsoft.com/office/drawing/2014/main" val="1881946298"/>
+                    <a16:rowId xmlns:a16="http://schemas.microsoft.com/office/drawing/2014/main" val="2570359792"/>
                   </a:ext>
                 </a:extLst>
               </a:tr>
-              <a:tr h="393366">
+              <a:tr h="418986">
+                <a:tc>
+                  <a:txBody>
+                    <a:bodyPr/>
+                    <a:lstStyle/>
+                    <a:p>
+                      <a:r>
+                        <a:rPr lang="en-US" sz="1600" dirty="0"/>
+                        <a:t>6</a:t>
+                      </a:r>
+                      <a:endParaRPr lang="ru-RU" sz="1600" dirty="0"/>
+                    </a:p>
+                  </a:txBody>
+                  <a:tcPr>
+                    <a:solidFill>
+                      <a:schemeClr val="bg1">
+                        <a:lumMod val="85000"/>
+                      </a:schemeClr>
+                    </a:solidFill>
+                  </a:tcPr>
+                </a:tc>
+                <a:tc>
+                  <a:txBody>
+                    <a:bodyPr/>
+                    <a:lstStyle/>
+                    <a:p>
+                      <a:r>
+                        <a:rPr lang="ru-RU" sz="1600" dirty="0"/>
+                        <a:t>Решить проблему в категориальных признаках</a:t>
+                      </a:r>
+                    </a:p>
+                  </a:txBody>
+                  <a:tcPr>
+                    <a:solidFill>
+                      <a:schemeClr val="bg1">
+                        <a:lumMod val="85000"/>
+                      </a:schemeClr>
+                    </a:solidFill>
+                  </a:tcPr>
+                </a:tc>
+                <a:tc>
+                  <a:txBody>
+                    <a:bodyPr/>
+                    <a:lstStyle/>
+                    <a:p>
+                      <a:r>
+                        <a:rPr lang="ru-RU" sz="1600" dirty="0"/>
+                        <a:t>Павлов Даниил</a:t>
+                      </a:r>
+                    </a:p>
+                  </a:txBody>
+                  <a:tcPr>
+                    <a:solidFill>
+                      <a:schemeClr val="bg1">
+                        <a:lumMod val="85000"/>
+                      </a:schemeClr>
+                    </a:solidFill>
+                  </a:tcPr>
+                </a:tc>
+                <a:tc>
+                  <a:txBody>
+                    <a:bodyPr/>
+                    <a:lstStyle/>
+                    <a:p>
+                      <a:r>
+                        <a:rPr lang="ru-RU" sz="1600" dirty="0"/>
+                        <a:t>100%</a:t>
+                      </a:r>
+                    </a:p>
+                  </a:txBody>
+                  <a:tcPr>
+                    <a:solidFill>
+                      <a:schemeClr val="bg1">
+                        <a:lumMod val="85000"/>
+                      </a:schemeClr>
+                    </a:solidFill>
+                  </a:tcPr>
+                </a:tc>
+                <a:extLst>
+                  <a:ext uri="{0D108BD9-81ED-4DB2-BD59-A6C34878D82A}">
+                    <a16:rowId xmlns:a16="http://schemas.microsoft.com/office/drawing/2014/main" val="3321950852"/>
+                  </a:ext>
+                </a:extLst>
+              </a:tr>
+              <a:tr h="593564">
                 <a:tc>
                   <a:txBody>
                     <a:bodyPr/>
@@ -4971,7 +5522,13 @@
                       </a:r>
                     </a:p>
                   </a:txBody>
-                  <a:tcPr/>
+                  <a:tcPr>
+                    <a:solidFill>
+                      <a:schemeClr val="bg1">
+                        <a:lumMod val="85000"/>
+                      </a:schemeClr>
+                    </a:solidFill>
+                  </a:tcPr>
                 </a:tc>
                 <a:tc>
                   <a:txBody>
@@ -4980,21 +5537,36 @@
                     <a:p>
                       <a:r>
                         <a:rPr lang="ru-RU" sz="1600" dirty="0"/>
-                        <a:t>Создать алгоритм, ищущий взаимосвязи между логами</a:t>
+                        <a:t>Нахождение самих аномалий</a:t>
                       </a:r>
                     </a:p>
                   </a:txBody>
-                  <a:tcPr/>
+                  <a:tcPr>
+                    <a:solidFill>
+                      <a:schemeClr val="bg1">
+                        <a:lumMod val="85000"/>
+                      </a:schemeClr>
+                    </a:solidFill>
+                  </a:tcPr>
                 </a:tc>
                 <a:tc>
                   <a:txBody>
                     <a:bodyPr/>
                     <a:lstStyle/>
                     <a:p>
-                      <a:endParaRPr lang="ru-RU" sz="1600" dirty="0"/>
+                      <a:r>
+                        <a:rPr lang="ru-RU" sz="1600" dirty="0"/>
+                        <a:t>Павлов Даниил</a:t>
+                      </a:r>
                     </a:p>
                   </a:txBody>
-                  <a:tcPr/>
+                  <a:tcPr>
+                    <a:solidFill>
+                      <a:schemeClr val="bg1">
+                        <a:lumMod val="85000"/>
+                      </a:schemeClr>
+                    </a:solidFill>
+                  </a:tcPr>
                 </a:tc>
                 <a:tc>
                   <a:txBody>
@@ -5020,11 +5592,20 @@
                       </a:pPr>
                       <a:r>
                         <a:rPr lang="ru-RU" sz="1600" dirty="0"/>
-                        <a:t>0%</a:t>
+                        <a:t>100%</a:t>
                       </a:r>
                     </a:p>
+                    <a:p>
+                      <a:endParaRPr lang="ru-RU" sz="1600" dirty="0"/>
+                    </a:p>
                   </a:txBody>
-                  <a:tcPr/>
+                  <a:tcPr>
+                    <a:solidFill>
+                      <a:schemeClr val="bg1">
+                        <a:lumMod val="85000"/>
+                      </a:schemeClr>
+                    </a:solidFill>
+                  </a:tcPr>
                 </a:tc>
                 <a:extLst>
                   <a:ext uri="{0D108BD9-81ED-4DB2-BD59-A6C34878D82A}">
@@ -5032,7 +5613,7 @@
                   </a:ext>
                 </a:extLst>
               </a:tr>
-              <a:tr h="646741">
+              <a:tr h="837972">
                 <a:tc>
                   <a:txBody>
                     <a:bodyPr/>
@@ -5044,7 +5625,13 @@
                       </a:r>
                     </a:p>
                   </a:txBody>
-                  <a:tcPr/>
+                  <a:tcPr>
+                    <a:solidFill>
+                      <a:schemeClr val="bg1">
+                        <a:lumMod val="85000"/>
+                      </a:schemeClr>
+                    </a:solidFill>
+                  </a:tcPr>
                 </a:tc>
                 <a:tc>
                   <a:txBody>
@@ -5053,21 +5640,42 @@
                     <a:p>
                       <a:r>
                         <a:rPr lang="ru-RU" sz="1600" dirty="0"/>
-                        <a:t>Всё это обернуть в готовый продукт(к примеру программу),которая сама будет вычислять аномалии.</a:t>
+                        <a:t>Всё это обернуть в готовый продукт(к примеру программу),которая сама будет вычислять вторжения и ошибки.</a:t>
                       </a:r>
                     </a:p>
                   </a:txBody>
-                  <a:tcPr/>
+                  <a:tcPr>
+                    <a:solidFill>
+                      <a:schemeClr val="bg1">
+                        <a:lumMod val="85000"/>
+                      </a:schemeClr>
+                    </a:solidFill>
+                  </a:tcPr>
                 </a:tc>
                 <a:tc>
                   <a:txBody>
                     <a:bodyPr/>
                     <a:lstStyle/>
                     <a:p>
-                      <a:endParaRPr lang="ru-RU" sz="1600" dirty="0"/>
+                      <a:r>
+                        <a:rPr lang="ru-RU" sz="1600" dirty="0"/>
+                        <a:t>Павлов Даниил</a:t>
+                      </a:r>
+                    </a:p>
+                    <a:p>
+                      <a:r>
+                        <a:rPr lang="ru-RU" sz="1600" dirty="0"/>
+                        <a:t>Верендеев Роман</a:t>
+                      </a:r>
                     </a:p>
                   </a:txBody>
-                  <a:tcPr/>
+                  <a:tcPr>
+                    <a:solidFill>
+                      <a:schemeClr val="bg1">
+                        <a:lumMod val="85000"/>
+                      </a:schemeClr>
+                    </a:solidFill>
+                  </a:tcPr>
                 </a:tc>
                 <a:tc>
                   <a:txBody>
@@ -5093,122 +5701,24 @@
                       </a:pPr>
                       <a:r>
                         <a:rPr lang="ru-RU" sz="1600" dirty="0"/>
-                        <a:t>0%</a:t>
+                        <a:t>100%</a:t>
                       </a:r>
                     </a:p>
+                    <a:p>
+                      <a:endParaRPr lang="ru-RU" sz="1600" dirty="0"/>
+                    </a:p>
                   </a:txBody>
-                  <a:tcPr/>
+                  <a:tcPr>
+                    <a:solidFill>
+                      <a:schemeClr val="bg1">
+                        <a:lumMod val="85000"/>
+                      </a:schemeClr>
+                    </a:solidFill>
+                  </a:tcPr>
                 </a:tc>
                 <a:extLst>
                   <a:ext uri="{0D108BD9-81ED-4DB2-BD59-A6C34878D82A}">
                     <a16:rowId xmlns:a16="http://schemas.microsoft.com/office/drawing/2014/main" val="2063020947"/>
-                  </a:ext>
-                </a:extLst>
-              </a:tr>
-              <a:tr h="501162">
-                <a:tc>
-                  <a:txBody>
-                    <a:bodyPr/>
-                    <a:lstStyle/>
-                    <a:p>
-                      <a:endParaRPr lang="ru-RU" sz="1600" dirty="0"/>
-                    </a:p>
-                  </a:txBody>
-                  <a:tcPr/>
-                </a:tc>
-                <a:tc>
-                  <a:txBody>
-                    <a:bodyPr/>
-                    <a:lstStyle/>
-                    <a:p>
-                      <a:r>
-                        <a:rPr lang="ru-RU" sz="1600" dirty="0"/>
-                        <a:t>Ввести параллельно </a:t>
-                      </a:r>
-                      <a:r>
-                        <a:rPr lang="en-US" sz="1600" dirty="0" err="1"/>
-                        <a:t>github</a:t>
-                      </a:r>
-                      <a:r>
-                        <a:rPr lang="en-US" sz="1600" dirty="0"/>
-                        <a:t> </a:t>
-                      </a:r>
-                      <a:r>
-                        <a:rPr lang="ru-RU" sz="1600" dirty="0"/>
-                        <a:t>и</a:t>
-                      </a:r>
-                      <a:r>
-                        <a:rPr lang="en-US" sz="1600" dirty="0"/>
-                        <a:t> </a:t>
-                      </a:r>
-                      <a:r>
-                        <a:rPr lang="en-US" sz="1600" dirty="0" err="1"/>
-                        <a:t>onlineword</a:t>
-                      </a:r>
-                      <a:r>
-                        <a:rPr lang="ru-RU" sz="1600" dirty="0"/>
-                        <a:t>-документацию, которые будут рассказывать более детально о проекте и его историю</a:t>
-                      </a:r>
-                    </a:p>
-                  </a:txBody>
-                  <a:tcPr/>
-                </a:tc>
-                <a:tc>
-                  <a:txBody>
-                    <a:bodyPr/>
-                    <a:lstStyle/>
-                    <a:p>
-                      <a:r>
-                        <a:rPr lang="ru-RU" sz="1600" dirty="0"/>
-                        <a:t>Павлов Даниил</a:t>
-                      </a:r>
-                    </a:p>
-                    <a:p>
-                      <a:r>
-                        <a:rPr lang="ru-RU" sz="1600" dirty="0" err="1"/>
-                        <a:t>Верендеев</a:t>
-                      </a:r>
-                      <a:r>
-                        <a:rPr lang="ru-RU" sz="1600" dirty="0"/>
-                        <a:t> Роман</a:t>
-                      </a:r>
-                    </a:p>
-                  </a:txBody>
-                  <a:tcPr/>
-                </a:tc>
-                <a:tc>
-                  <a:txBody>
-                    <a:bodyPr/>
-                    <a:lstStyle/>
-                    <a:p>
-                      <a:pPr marL="0" marR="0" lvl="0" indent="0" algn="l" defTabSz="914400" rtl="0" eaLnBrk="1" fontAlgn="auto" latinLnBrk="0" hangingPunct="1">
-                        <a:lnSpc>
-                          <a:spcPct val="100000"/>
-                        </a:lnSpc>
-                        <a:spcBef>
-                          <a:spcPts val="0"/>
-                        </a:spcBef>
-                        <a:spcAft>
-                          <a:spcPts val="0"/>
-                        </a:spcAft>
-                        <a:buClrTx/>
-                        <a:buSzTx/>
-                        <a:buFontTx/>
-                        <a:buNone/>
-                        <a:tabLst/>
-                        <a:defRPr/>
-                      </a:pPr>
-                      <a:r>
-                        <a:rPr lang="ru-RU" sz="1600" dirty="0"/>
-                        <a:t>выполняется</a:t>
-                      </a:r>
-                    </a:p>
-                  </a:txBody>
-                  <a:tcPr/>
-                </a:tc>
-                <a:extLst>
-                  <a:ext uri="{0D108BD9-81ED-4DB2-BD59-A6C34878D82A}">
-                    <a16:rowId xmlns:a16="http://schemas.microsoft.com/office/drawing/2014/main" val="1178544041"/>
                   </a:ext>
                 </a:extLst>
               </a:tr>
@@ -5262,12 +5772,7 @@
             <p:ph type="title"/>
           </p:nvPr>
         </p:nvSpPr>
-        <p:spPr>
-          <a:xfrm>
-            <a:off x="699798" y="141732"/>
-            <a:ext cx="10058400" cy="1609344"/>
-          </a:xfrm>
-        </p:spPr>
+        <p:spPr/>
         <p:txBody>
           <a:bodyPr/>
           <a:lstStyle/>
@@ -5276,6 +5781,31 @@
               <a:rPr lang="ru-RU" dirty="0"/>
               <a:t>Ход работы</a:t>
             </a:r>
+          </a:p>
+        </p:txBody>
+      </p:sp>
+      <p:sp>
+        <p:nvSpPr>
+          <p:cNvPr id="3" name="Объект 2">
+            <a:extLst>
+              <a:ext uri="{FF2B5EF4-FFF2-40B4-BE49-F238E27FC236}">
+                <a16:creationId xmlns:a16="http://schemas.microsoft.com/office/drawing/2014/main" id="{6D2917BB-B771-413C-88B4-AD1CCB439E7D}"/>
+              </a:ext>
+            </a:extLst>
+          </p:cNvPr>
+          <p:cNvSpPr>
+            <a:spLocks noGrp="1"/>
+          </p:cNvSpPr>
+          <p:nvPr>
+            <p:ph idx="1"/>
+          </p:nvPr>
+        </p:nvSpPr>
+        <p:spPr/>
+        <p:txBody>
+          <a:bodyPr/>
+          <a:lstStyle/>
+          <a:p>
+            <a:endParaRPr lang="ru-RU" dirty="0"/>
           </a:p>
         </p:txBody>
       </p:sp>
@@ -5301,42 +5831,12 @@
         </p:blipFill>
         <p:spPr>
           <a:xfrm>
-            <a:off x="951783" y="1502392"/>
-            <a:ext cx="9806415" cy="4511548"/>
+            <a:off x="951783" y="1660652"/>
+            <a:ext cx="9806415" cy="4861446"/>
           </a:xfrm>
           <a:prstGeom prst="rect">
             <a:avLst/>
           </a:prstGeom>
-          <a:solidFill>
-            <a:srgbClr val="FFFFFF">
-              <a:shade val="85000"/>
-            </a:srgbClr>
-          </a:solidFill>
-          <a:ln w="88900" cap="sq">
-            <a:solidFill>
-              <a:srgbClr val="FFFFFF"/>
-            </a:solidFill>
-            <a:miter lim="800000"/>
-          </a:ln>
-          <a:effectLst>
-            <a:outerShdw blurRad="55000" dist="18000" dir="5400000" algn="tl" rotWithShape="0">
-              <a:srgbClr val="000000">
-                <a:alpha val="40000"/>
-              </a:srgbClr>
-            </a:outerShdw>
-          </a:effectLst>
-          <a:scene3d>
-            <a:camera prst="orthographicFront"/>
-            <a:lightRig rig="twoPt" dir="t">
-              <a:rot lat="0" lon="0" rev="7200000"/>
-            </a:lightRig>
-          </a:scene3d>
-          <a:sp3d>
-            <a:bevelT w="25400" h="19050"/>
-            <a:contourClr>
-              <a:srgbClr val="FFFFFF"/>
-            </a:contourClr>
-          </a:sp3d>
         </p:spPr>
       </p:pic>
     </p:spTree>
@@ -5371,10 +5871,35 @@
       </p:grpSpPr>
       <p:sp>
         <p:nvSpPr>
+          <p:cNvPr id="2" name="Заголовок 1">
+            <a:extLst>
+              <a:ext uri="{FF2B5EF4-FFF2-40B4-BE49-F238E27FC236}">
+                <a16:creationId xmlns:a16="http://schemas.microsoft.com/office/drawing/2014/main" id="{80470D90-A876-4A25-A445-0DBB5D775CEF}"/>
+              </a:ext>
+            </a:extLst>
+          </p:cNvPr>
+          <p:cNvSpPr>
+            <a:spLocks noGrp="1"/>
+          </p:cNvSpPr>
+          <p:nvPr>
+            <p:ph type="title"/>
+          </p:nvPr>
+        </p:nvSpPr>
+        <p:spPr/>
+        <p:txBody>
+          <a:bodyPr/>
+          <a:lstStyle/>
+          <a:p>
+            <a:endParaRPr lang="ru-RU"/>
+          </a:p>
+        </p:txBody>
+      </p:sp>
+      <p:sp>
+        <p:nvSpPr>
           <p:cNvPr id="3" name="Объект 2">
             <a:extLst>
               <a:ext uri="{FF2B5EF4-FFF2-40B4-BE49-F238E27FC236}">
-                <a16:creationId xmlns:a16="http://schemas.microsoft.com/office/drawing/2014/main" id="{4BA9E755-EC68-4C2E-929C-50D55BF539C9}"/>
+                <a16:creationId xmlns:a16="http://schemas.microsoft.com/office/drawing/2014/main" id="{49B91592-06AC-4E4C-85CF-71D569F6C35D}"/>
               </a:ext>
             </a:extLst>
           </p:cNvPr>
@@ -5390,116 +5915,10 @@
           <a:bodyPr/>
           <a:lstStyle/>
           <a:p>
-            <a:endParaRPr lang="ru-RU"/>
-          </a:p>
-        </p:txBody>
-      </p:sp>
-      <p:pic>
-        <p:nvPicPr>
-          <p:cNvPr id="1028" name="Picture 4">
-            <a:extLst>
-              <a:ext uri="{FF2B5EF4-FFF2-40B4-BE49-F238E27FC236}">
-                <a16:creationId xmlns:a16="http://schemas.microsoft.com/office/drawing/2014/main" id="{AB9F5DE9-3B79-413B-88B7-9BF9FDCBEA0F}"/>
-              </a:ext>
-            </a:extLst>
-          </p:cNvPr>
-          <p:cNvPicPr>
-            <a:picLocks noChangeAspect="1" noChangeArrowheads="1"/>
-          </p:cNvPicPr>
-          <p:nvPr/>
-        </p:nvPicPr>
-        <p:blipFill>
-          <a:blip r:embed="rId2">
-            <a:extLst>
-              <a:ext uri="{28A0092B-C50C-407E-A947-70E740481C1C}">
-                <a14:useLocalDpi xmlns:a14="http://schemas.microsoft.com/office/drawing/2010/main" val="0"/>
-              </a:ext>
-            </a:extLst>
-          </a:blip>
-          <a:srcRect/>
-          <a:stretch>
-            <a:fillRect/>
-          </a:stretch>
-        </p:blipFill>
-        <p:spPr bwMode="auto">
-          <a:xfrm>
-            <a:off x="879231" y="853982"/>
-            <a:ext cx="10926848" cy="5318217"/>
-          </a:xfrm>
-          <a:prstGeom prst="rect">
-            <a:avLst/>
-          </a:prstGeom>
-          <a:solidFill>
-            <a:srgbClr val="FFFFFF">
-              <a:shade val="85000"/>
-            </a:srgbClr>
-          </a:solidFill>
-          <a:ln w="88900" cap="sq">
-            <a:solidFill>
-              <a:srgbClr val="FFFFFF"/>
-            </a:solidFill>
-            <a:miter lim="800000"/>
-          </a:ln>
-          <a:effectLst>
-            <a:outerShdw blurRad="55000" dist="18000" dir="5400000" algn="tl" rotWithShape="0">
-              <a:srgbClr val="000000">
-                <a:alpha val="40000"/>
-              </a:srgbClr>
-            </a:outerShdw>
-          </a:effectLst>
-          <a:scene3d>
-            <a:camera prst="orthographicFront"/>
-            <a:lightRig rig="twoPt" dir="t">
-              <a:rot lat="0" lon="0" rev="7200000"/>
-            </a:lightRig>
-          </a:scene3d>
-          <a:sp3d>
-            <a:bevelT w="25400" h="19050"/>
-            <a:contourClr>
-              <a:srgbClr val="FFFFFF"/>
-            </a:contourClr>
-          </a:sp3d>
-          <a:extLst>
-            <a:ext uri="{909E8E84-426E-40DD-AFC4-6F175D3DCCD1}">
-              <a14:hiddenFill xmlns:a14="http://schemas.microsoft.com/office/drawing/2010/main">
-                <a:solidFill>
-                  <a:srgbClr val="FFFFFF"/>
-                </a:solidFill>
-              </a14:hiddenFill>
-            </a:ext>
-          </a:extLst>
-        </p:spPr>
-      </p:pic>
-    </p:spTree>
-    <p:extLst>
-      <p:ext uri="{BB962C8B-B14F-4D97-AF65-F5344CB8AC3E}">
-        <p14:creationId xmlns:p14="http://schemas.microsoft.com/office/powerpoint/2010/main" val="1782696798"/>
-      </p:ext>
-    </p:extLst>
-  </p:cSld>
-  <p:clrMapOvr>
-    <a:masterClrMapping/>
-  </p:clrMapOvr>
-</p:sld>
-</file>
-
-<file path=ppt/slides/slide7.xml><?xml version="1.0" encoding="utf-8"?>
-<p:sld xmlns:a="http://schemas.openxmlformats.org/drawingml/2006/main" xmlns:r="http://schemas.openxmlformats.org/officeDocument/2006/relationships" xmlns:p="http://schemas.openxmlformats.org/presentationml/2006/main">
-  <p:cSld>
-    <p:spTree>
-      <p:nvGrpSpPr>
-        <p:cNvPr id="1" name=""/>
-        <p:cNvGrpSpPr/>
-        <p:nvPr/>
-      </p:nvGrpSpPr>
-      <p:grpSpPr>
-        <a:xfrm>
-          <a:off x="0" y="0"/>
-          <a:ext cx="0" cy="0"/>
-          <a:chOff x="0" y="0"/>
-          <a:chExt cx="0" cy="0"/>
-        </a:xfrm>
-      </p:grpSpPr>
+            <a:endParaRPr lang="ru-RU" dirty="0"/>
+          </a:p>
+        </p:txBody>
+      </p:sp>
       <p:pic>
         <p:nvPicPr>
           <p:cNvPr id="2050" name="Picture 2">
@@ -5529,41 +5948,13 @@
         </p:blipFill>
         <p:spPr bwMode="auto">
           <a:xfrm>
-            <a:off x="606610" y="1090246"/>
-            <a:ext cx="11449725" cy="4610757"/>
+            <a:off x="135664" y="900598"/>
+            <a:ext cx="11920671" cy="4800405"/>
           </a:xfrm>
           <a:prstGeom prst="rect">
             <a:avLst/>
           </a:prstGeom>
-          <a:solidFill>
-            <a:srgbClr val="FFFFFF">
-              <a:shade val="85000"/>
-            </a:srgbClr>
-          </a:solidFill>
-          <a:ln w="190500" cap="rnd">
-            <a:solidFill>
-              <a:srgbClr val="FFFFFF"/>
-            </a:solidFill>
-          </a:ln>
-          <a:effectLst>
-            <a:outerShdw blurRad="50000" algn="tl" rotWithShape="0">
-              <a:srgbClr val="000000">
-                <a:alpha val="41000"/>
-              </a:srgbClr>
-            </a:outerShdw>
-          </a:effectLst>
-          <a:scene3d>
-            <a:camera prst="orthographicFront"/>
-            <a:lightRig rig="twoPt" dir="t">
-              <a:rot lat="0" lon="0" rev="7800000"/>
-            </a:lightRig>
-          </a:scene3d>
-          <a:sp3d contourW="6350">
-            <a:bevelT w="50800" h="16510"/>
-            <a:contourClr>
-              <a:srgbClr val="C0C0C0"/>
-            </a:contourClr>
-          </a:sp3d>
+          <a:noFill/>
           <a:extLst>
             <a:ext uri="{909E8E84-426E-40DD-AFC4-6F175D3DCCD1}">
               <a14:hiddenFill xmlns:a14="http://schemas.microsoft.com/office/drawing/2010/main">
@@ -5579,6 +5970,133 @@
     <p:extLst>
       <p:ext uri="{BB962C8B-B14F-4D97-AF65-F5344CB8AC3E}">
         <p14:creationId xmlns:p14="http://schemas.microsoft.com/office/powerpoint/2010/main" val="906869489"/>
+      </p:ext>
+    </p:extLst>
+  </p:cSld>
+  <p:clrMapOvr>
+    <a:masterClrMapping/>
+  </p:clrMapOvr>
+</p:sld>
+</file>
+
+<file path=ppt/slides/slide7.xml><?xml version="1.0" encoding="utf-8"?>
+<p:sld xmlns:a="http://schemas.openxmlformats.org/drawingml/2006/main" xmlns:r="http://schemas.openxmlformats.org/officeDocument/2006/relationships" xmlns:p="http://schemas.openxmlformats.org/presentationml/2006/main">
+  <p:cSld>
+    <p:spTree>
+      <p:nvGrpSpPr>
+        <p:cNvPr id="1" name=""/>
+        <p:cNvGrpSpPr/>
+        <p:nvPr/>
+      </p:nvGrpSpPr>
+      <p:grpSpPr>
+        <a:xfrm>
+          <a:off x="0" y="0"/>
+          <a:ext cx="0" cy="0"/>
+          <a:chOff x="0" y="0"/>
+          <a:chExt cx="0" cy="0"/>
+        </a:xfrm>
+      </p:grpSpPr>
+      <p:sp>
+        <p:nvSpPr>
+          <p:cNvPr id="2" name="Заголовок 1">
+            <a:extLst>
+              <a:ext uri="{FF2B5EF4-FFF2-40B4-BE49-F238E27FC236}">
+                <a16:creationId xmlns:a16="http://schemas.microsoft.com/office/drawing/2014/main" id="{9618E7A3-AE0B-47E2-962D-E47CBD2AB0A0}"/>
+              </a:ext>
+            </a:extLst>
+          </p:cNvPr>
+          <p:cNvSpPr>
+            <a:spLocks noGrp="1"/>
+          </p:cNvSpPr>
+          <p:nvPr>
+            <p:ph type="title"/>
+          </p:nvPr>
+        </p:nvSpPr>
+        <p:spPr/>
+        <p:txBody>
+          <a:bodyPr/>
+          <a:lstStyle/>
+          <a:p>
+            <a:endParaRPr lang="ru-RU"/>
+          </a:p>
+        </p:txBody>
+      </p:sp>
+      <p:sp>
+        <p:nvSpPr>
+          <p:cNvPr id="3" name="Объект 2">
+            <a:extLst>
+              <a:ext uri="{FF2B5EF4-FFF2-40B4-BE49-F238E27FC236}">
+                <a16:creationId xmlns:a16="http://schemas.microsoft.com/office/drawing/2014/main" id="{8FE64446-AF9D-48FA-B0A5-EC789BC3D484}"/>
+              </a:ext>
+            </a:extLst>
+          </p:cNvPr>
+          <p:cNvSpPr>
+            <a:spLocks noGrp="1"/>
+          </p:cNvSpPr>
+          <p:nvPr>
+            <p:ph idx="1"/>
+          </p:nvPr>
+        </p:nvSpPr>
+        <p:spPr/>
+        <p:txBody>
+          <a:bodyPr/>
+          <a:lstStyle/>
+          <a:p>
+            <a:endParaRPr lang="ru-RU" dirty="0"/>
+          </a:p>
+        </p:txBody>
+      </p:sp>
+      <p:pic>
+        <p:nvPicPr>
+          <p:cNvPr id="2050" name="Picture 2">
+            <a:extLst>
+              <a:ext uri="{FF2B5EF4-FFF2-40B4-BE49-F238E27FC236}">
+                <a16:creationId xmlns:a16="http://schemas.microsoft.com/office/drawing/2014/main" id="{4EF1D014-6EB9-4577-9DAB-607E3769C4A4}"/>
+              </a:ext>
+            </a:extLst>
+          </p:cNvPr>
+          <p:cNvPicPr>
+            <a:picLocks noChangeAspect="1" noChangeArrowheads="1"/>
+          </p:cNvPicPr>
+          <p:nvPr/>
+        </p:nvPicPr>
+        <p:blipFill>
+          <a:blip r:embed="rId2">
+            <a:extLst>
+              <a:ext uri="{28A0092B-C50C-407E-A947-70E740481C1C}">
+                <a14:useLocalDpi xmlns:a14="http://schemas.microsoft.com/office/drawing/2010/main" val="0"/>
+              </a:ext>
+            </a:extLst>
+          </a:blip>
+          <a:srcRect/>
+          <a:stretch>
+            <a:fillRect/>
+          </a:stretch>
+        </p:blipFill>
+        <p:spPr bwMode="auto">
+          <a:xfrm>
+            <a:off x="827546" y="864786"/>
+            <a:ext cx="10536907" cy="5128428"/>
+          </a:xfrm>
+          <a:prstGeom prst="rect">
+            <a:avLst/>
+          </a:prstGeom>
+          <a:noFill/>
+          <a:extLst>
+            <a:ext uri="{909E8E84-426E-40DD-AFC4-6F175D3DCCD1}">
+              <a14:hiddenFill xmlns:a14="http://schemas.microsoft.com/office/drawing/2010/main">
+                <a:solidFill>
+                  <a:srgbClr val="FFFFFF"/>
+                </a:solidFill>
+              </a14:hiddenFill>
+            </a:ext>
+          </a:extLst>
+        </p:spPr>
+      </p:pic>
+    </p:spTree>
+    <p:extLst>
+      <p:ext uri="{BB962C8B-B14F-4D97-AF65-F5344CB8AC3E}">
+        <p14:creationId xmlns:p14="http://schemas.microsoft.com/office/powerpoint/2010/main" val="3838093261"/>
       </p:ext>
     </p:extLst>
   </p:cSld>
@@ -5610,7 +6128,7 @@
           <p:cNvPr id="2" name="Заголовок 1">
             <a:extLst>
               <a:ext uri="{FF2B5EF4-FFF2-40B4-BE49-F238E27FC236}">
-                <a16:creationId xmlns:a16="http://schemas.microsoft.com/office/drawing/2014/main" id="{737434F8-DDDD-42BC-86FA-BBCB9D58155C}"/>
+                <a16:creationId xmlns:a16="http://schemas.microsoft.com/office/drawing/2014/main" id="{0DDDAC17-4EB5-4A2A-B55E-CBA01C284C90}"/>
               </a:ext>
             </a:extLst>
           </p:cNvPr>
@@ -5621,27 +6139,254 @@
             <p:ph type="title"/>
           </p:nvPr>
         </p:nvSpPr>
-        <p:spPr>
-          <a:xfrm>
-            <a:off x="1063752" y="2723979"/>
-            <a:ext cx="10058400" cy="1609344"/>
-          </a:xfrm>
-        </p:spPr>
+        <p:spPr/>
         <p:txBody>
           <a:bodyPr/>
           <a:lstStyle/>
           <a:p>
-            <a:r>
-              <a:rPr lang="ru-RU" dirty="0"/>
-              <a:t>Спасибо за внимание!</a:t>
-            </a:r>
-          </a:p>
-        </p:txBody>
-      </p:sp>
+            <a:endParaRPr lang="ru-RU"/>
+          </a:p>
+        </p:txBody>
+      </p:sp>
+      <p:sp>
+        <p:nvSpPr>
+          <p:cNvPr id="3" name="Объект 2">
+            <a:extLst>
+              <a:ext uri="{FF2B5EF4-FFF2-40B4-BE49-F238E27FC236}">
+                <a16:creationId xmlns:a16="http://schemas.microsoft.com/office/drawing/2014/main" id="{109342A4-B2DF-45D5-B227-9F5845F86AFC}"/>
+              </a:ext>
+            </a:extLst>
+          </p:cNvPr>
+          <p:cNvSpPr>
+            <a:spLocks noGrp="1"/>
+          </p:cNvSpPr>
+          <p:nvPr>
+            <p:ph idx="1"/>
+          </p:nvPr>
+        </p:nvSpPr>
+        <p:spPr/>
+        <p:txBody>
+          <a:bodyPr/>
+          <a:lstStyle/>
+          <a:p>
+            <a:endParaRPr lang="ru-RU"/>
+          </a:p>
+        </p:txBody>
+      </p:sp>
+      <p:pic>
+        <p:nvPicPr>
+          <p:cNvPr id="3074" name="Picture 2">
+            <a:extLst>
+              <a:ext uri="{FF2B5EF4-FFF2-40B4-BE49-F238E27FC236}">
+                <a16:creationId xmlns:a16="http://schemas.microsoft.com/office/drawing/2014/main" id="{37092BF7-78C5-46EC-BFE1-752B2213F54E}"/>
+              </a:ext>
+            </a:extLst>
+          </p:cNvPr>
+          <p:cNvPicPr>
+            <a:picLocks noChangeAspect="1" noChangeArrowheads="1"/>
+          </p:cNvPicPr>
+          <p:nvPr/>
+        </p:nvPicPr>
+        <p:blipFill>
+          <a:blip r:embed="rId2">
+            <a:extLst>
+              <a:ext uri="{28A0092B-C50C-407E-A947-70E740481C1C}">
+                <a14:useLocalDpi xmlns:a14="http://schemas.microsoft.com/office/drawing/2010/main" val="0"/>
+              </a:ext>
+            </a:extLst>
+          </a:blip>
+          <a:srcRect/>
+          <a:stretch>
+            <a:fillRect/>
+          </a:stretch>
+        </p:blipFill>
+        <p:spPr bwMode="auto">
+          <a:xfrm>
+            <a:off x="1197287" y="0"/>
+            <a:ext cx="8521747" cy="6472429"/>
+          </a:xfrm>
+          <a:prstGeom prst="rect">
+            <a:avLst/>
+          </a:prstGeom>
+          <a:noFill/>
+          <a:extLst>
+            <a:ext uri="{909E8E84-426E-40DD-AFC4-6F175D3DCCD1}">
+              <a14:hiddenFill xmlns:a14="http://schemas.microsoft.com/office/drawing/2010/main">
+                <a:solidFill>
+                  <a:srgbClr val="FFFFFF"/>
+                </a:solidFill>
+              </a14:hiddenFill>
+            </a:ext>
+          </a:extLst>
+        </p:spPr>
+      </p:pic>
     </p:spTree>
     <p:extLst>
       <p:ext uri="{BB962C8B-B14F-4D97-AF65-F5344CB8AC3E}">
-        <p14:creationId xmlns:p14="http://schemas.microsoft.com/office/powerpoint/2010/main" val="1585657996"/>
+        <p14:creationId xmlns:p14="http://schemas.microsoft.com/office/powerpoint/2010/main" val="895282029"/>
+      </p:ext>
+    </p:extLst>
+  </p:cSld>
+  <p:clrMapOvr>
+    <a:masterClrMapping/>
+  </p:clrMapOvr>
+</p:sld>
+</file>
+
+<file path=ppt/slides/slide9.xml><?xml version="1.0" encoding="utf-8"?>
+<p:sld xmlns:a="http://schemas.openxmlformats.org/drawingml/2006/main" xmlns:r="http://schemas.openxmlformats.org/officeDocument/2006/relationships" xmlns:p="http://schemas.openxmlformats.org/presentationml/2006/main">
+  <p:cSld>
+    <p:spTree>
+      <p:nvGrpSpPr>
+        <p:cNvPr id="1" name=""/>
+        <p:cNvGrpSpPr/>
+        <p:nvPr/>
+      </p:nvGrpSpPr>
+      <p:grpSpPr>
+        <a:xfrm>
+          <a:off x="0" y="0"/>
+          <a:ext cx="0" cy="0"/>
+          <a:chOff x="0" y="0"/>
+          <a:chExt cx="0" cy="0"/>
+        </a:xfrm>
+      </p:grpSpPr>
+      <p:sp>
+        <p:nvSpPr>
+          <p:cNvPr id="3" name="Объект 2">
+            <a:extLst>
+              <a:ext uri="{FF2B5EF4-FFF2-40B4-BE49-F238E27FC236}">
+                <a16:creationId xmlns:a16="http://schemas.microsoft.com/office/drawing/2014/main" id="{0AB157B7-4DC9-416B-BB47-DFC2BCB162C1}"/>
+              </a:ext>
+            </a:extLst>
+          </p:cNvPr>
+          <p:cNvSpPr>
+            <a:spLocks noGrp="1"/>
+          </p:cNvSpPr>
+          <p:nvPr>
+            <p:ph idx="1"/>
+          </p:nvPr>
+        </p:nvSpPr>
+        <p:spPr>
+          <a:xfrm>
+            <a:off x="1024568" y="1403604"/>
+            <a:ext cx="10058400" cy="4050792"/>
+          </a:xfrm>
+        </p:spPr>
+        <p:txBody>
+          <a:bodyPr>
+            <a:normAutofit fontScale="92500" lnSpcReduction="10000"/>
+          </a:bodyPr>
+          <a:lstStyle/>
+          <a:p>
+            <a:pPr marL="457200" rtl="0">
+              <a:spcBef>
+                <a:spcPts val="1300"/>
+              </a:spcBef>
+              <a:spcAft>
+                <a:spcPts val="1300"/>
+              </a:spcAft>
+            </a:pPr>
+            <a:r>
+              <a:rPr lang="ru-RU" sz="4000" b="1" i="0" u="none" strike="noStrike" dirty="0" err="1">
+                <a:solidFill>
+                  <a:srgbClr val="333333"/>
+                </a:solidFill>
+                <a:effectLst/>
+                <a:latin typeface="Arial" panose="020B0604020202020204" pitchFamily="34" charset="0"/>
+              </a:rPr>
+              <a:t>ParentProcessId</a:t>
+            </a:r>
+            <a:r>
+              <a:rPr lang="ru-RU" sz="4000" b="0" i="0" u="none" strike="noStrike" dirty="0">
+                <a:solidFill>
+                  <a:srgbClr val="333333"/>
+                </a:solidFill>
+                <a:effectLst/>
+                <a:latin typeface="Arial" panose="020B0604020202020204" pitchFamily="34" charset="0"/>
+              </a:rPr>
+              <a:t>-Идентификатор процесса </a:t>
+            </a:r>
+            <a:r>
+              <a:rPr lang="ru-RU" sz="4000" b="0" i="0" u="none" strike="noStrike" dirty="0" err="1">
+                <a:solidFill>
+                  <a:srgbClr val="333333"/>
+                </a:solidFill>
+                <a:effectLst/>
+                <a:latin typeface="Arial" panose="020B0604020202020204" pitchFamily="34" charset="0"/>
+              </a:rPr>
+              <a:t>процесса</a:t>
+            </a:r>
+            <a:r>
+              <a:rPr lang="ru-RU" sz="4000" b="0" i="0" u="none" strike="noStrike" dirty="0">
+                <a:solidFill>
+                  <a:srgbClr val="333333"/>
+                </a:solidFill>
+                <a:effectLst/>
+                <a:latin typeface="Arial" panose="020B0604020202020204" pitchFamily="34" charset="0"/>
+              </a:rPr>
+              <a:t>, который породил/создал основной процесс.</a:t>
+            </a:r>
+          </a:p>
+          <a:p>
+            <a:pPr marL="457200" rtl="0">
+              <a:spcBef>
+                <a:spcPts val="1300"/>
+              </a:spcBef>
+              <a:spcAft>
+                <a:spcPts val="1300"/>
+              </a:spcAft>
+            </a:pPr>
+            <a:r>
+              <a:rPr lang="ru-RU" sz="4000" b="1" i="0" u="none" strike="noStrike" dirty="0" err="1">
+                <a:solidFill>
+                  <a:srgbClr val="333333"/>
+                </a:solidFill>
+                <a:effectLst/>
+                <a:latin typeface="Arial" panose="020B0604020202020204" pitchFamily="34" charset="0"/>
+              </a:rPr>
+              <a:t>ProcessId</a:t>
+            </a:r>
+            <a:r>
+              <a:rPr lang="ru-RU" sz="4000" b="0" i="0" u="none" strike="noStrike" dirty="0">
+                <a:solidFill>
+                  <a:srgbClr val="333333"/>
+                </a:solidFill>
+                <a:effectLst/>
+                <a:latin typeface="Arial" panose="020B0604020202020204" pitchFamily="34" charset="0"/>
+              </a:rPr>
+              <a:t>-Идентификатор процесса </a:t>
+            </a:r>
+            <a:r>
+              <a:rPr lang="ru-RU" sz="4000" b="0" i="0" u="none" strike="noStrike" dirty="0" err="1">
+                <a:solidFill>
+                  <a:srgbClr val="333333"/>
+                </a:solidFill>
+                <a:effectLst/>
+                <a:latin typeface="Arial" panose="020B0604020202020204" pitchFamily="34" charset="0"/>
+              </a:rPr>
+              <a:t>ProcessId</a:t>
+            </a:r>
+            <a:r>
+              <a:rPr lang="ru-RU" sz="4000" b="0" i="0" u="none" strike="noStrike" dirty="0">
+                <a:solidFill>
+                  <a:srgbClr val="333333"/>
+                </a:solidFill>
+                <a:effectLst/>
+                <a:latin typeface="Arial" panose="020B0604020202020204" pitchFamily="34" charset="0"/>
+              </a:rPr>
+              <a:t>, используемый операционной системой для идентификации созданного процесса.</a:t>
+            </a:r>
+            <a:br>
+              <a:rPr lang="ru-RU" dirty="0"/>
+            </a:br>
+            <a:endParaRPr lang="ru-RU" dirty="0"/>
+          </a:p>
+        </p:txBody>
+      </p:sp>
+    </p:spTree>
+    <p:extLst>
+      <p:ext uri="{BB962C8B-B14F-4D97-AF65-F5344CB8AC3E}">
+        <p14:creationId xmlns:p14="http://schemas.microsoft.com/office/powerpoint/2010/main" val="148980523"/>
       </p:ext>
     </p:extLst>
   </p:cSld>

</xml_diff>